<commit_message>
updated deck; added reference data; tweaked query samples
</commit_message>
<xml_diff>
--- a/stream-processing-galaxy.pptx
+++ b/stream-processing-galaxy.pptx
@@ -215,7 +215,7 @@
           <a:p>
             <a:fld id="{D3E57187-9A38-7B49-9A89-339F6723DB01}" type="datetimeFigureOut">
               <a:rPr lang="en-US" smtClean="0"/>
-              <a:t>6/6/19</a:t>
+              <a:t>6/7/19</a:t>
             </a:fld>
             <a:endParaRPr lang="en-US"/>
           </a:p>
@@ -629,7 +629,7 @@
           <a:p>
             <a:fld id="{E54C60CF-FB58-1E4B-A6D0-C94527E30409}" type="datetimeFigureOut">
               <a:rPr lang="en-US" smtClean="0"/>
-              <a:t>6/6/19</a:t>
+              <a:t>6/7/19</a:t>
             </a:fld>
             <a:endParaRPr lang="en-US"/>
           </a:p>
@@ -827,7 +827,7 @@
           <a:p>
             <a:fld id="{E54C60CF-FB58-1E4B-A6D0-C94527E30409}" type="datetimeFigureOut">
               <a:rPr lang="en-US" smtClean="0"/>
-              <a:t>6/6/19</a:t>
+              <a:t>6/7/19</a:t>
             </a:fld>
             <a:endParaRPr lang="en-US"/>
           </a:p>
@@ -1035,7 +1035,7 @@
           <a:p>
             <a:fld id="{E54C60CF-FB58-1E4B-A6D0-C94527E30409}" type="datetimeFigureOut">
               <a:rPr lang="en-US" smtClean="0"/>
-              <a:t>6/6/19</a:t>
+              <a:t>6/7/19</a:t>
             </a:fld>
             <a:endParaRPr lang="en-US"/>
           </a:p>
@@ -1811,7 +1811,7 @@
           <a:p>
             <a:fld id="{E54C60CF-FB58-1E4B-A6D0-C94527E30409}" type="datetimeFigureOut">
               <a:rPr lang="en-US" smtClean="0"/>
-              <a:t>6/6/19</a:t>
+              <a:t>6/7/19</a:t>
             </a:fld>
             <a:endParaRPr lang="en-US"/>
           </a:p>
@@ -2223,7 +2223,7 @@
           <a:p>
             <a:fld id="{E54C60CF-FB58-1E4B-A6D0-C94527E30409}" type="datetimeFigureOut">
               <a:rPr lang="en-US" smtClean="0"/>
-              <a:t>6/6/19</a:t>
+              <a:t>6/7/19</a:t>
             </a:fld>
             <a:endParaRPr lang="en-US"/>
           </a:p>
@@ -2364,7 +2364,7 @@
           <a:p>
             <a:fld id="{E54C60CF-FB58-1E4B-A6D0-C94527E30409}" type="datetimeFigureOut">
               <a:rPr lang="en-US" smtClean="0"/>
-              <a:t>6/6/19</a:t>
+              <a:t>6/7/19</a:t>
             </a:fld>
             <a:endParaRPr lang="en-US"/>
           </a:p>
@@ -2477,7 +2477,7 @@
           <a:p>
             <a:fld id="{E54C60CF-FB58-1E4B-A6D0-C94527E30409}" type="datetimeFigureOut">
               <a:rPr lang="en-US" smtClean="0"/>
-              <a:t>6/6/19</a:t>
+              <a:t>6/7/19</a:t>
             </a:fld>
             <a:endParaRPr lang="en-US"/>
           </a:p>
@@ -2788,7 +2788,7 @@
           <a:p>
             <a:fld id="{E54C60CF-FB58-1E4B-A6D0-C94527E30409}" type="datetimeFigureOut">
               <a:rPr lang="en-US" smtClean="0"/>
-              <a:t>6/6/19</a:t>
+              <a:t>6/7/19</a:t>
             </a:fld>
             <a:endParaRPr lang="en-US"/>
           </a:p>
@@ -3076,7 +3076,7 @@
           <a:p>
             <a:fld id="{E54C60CF-FB58-1E4B-A6D0-C94527E30409}" type="datetimeFigureOut">
               <a:rPr lang="en-US" smtClean="0"/>
-              <a:t>6/6/19</a:t>
+              <a:t>6/7/19</a:t>
             </a:fld>
             <a:endParaRPr lang="en-US"/>
           </a:p>
@@ -3322,7 +3322,7 @@
           <a:p>
             <a:fld id="{E54C60CF-FB58-1E4B-A6D0-C94527E30409}" type="datetimeFigureOut">
               <a:rPr lang="en-US" smtClean="0"/>
-              <a:t>6/6/19</a:t>
+              <a:t>6/7/19</a:t>
             </a:fld>
             <a:endParaRPr lang="en-US"/>
           </a:p>
@@ -5268,31 +5268,96 @@
           </a:p>
         </p:txBody>
       </p:sp>
-      <p:sp>
-        <p:nvSpPr>
-          <p:cNvPr id="3" name="Content Placeholder 2">
+      <p:pic>
+        <p:nvPicPr>
+          <p:cNvPr id="4" name="Picture 3">
             <a:extLst>
               <a:ext uri="{FF2B5EF4-FFF2-40B4-BE49-F238E27FC236}">
-                <a16:creationId xmlns:a16="http://schemas.microsoft.com/office/drawing/2014/main" id="{89CA88DD-3751-234B-BED3-8ADA0FF5F1FA}"/>
+                <a16:creationId xmlns:a16="http://schemas.microsoft.com/office/drawing/2014/main" id="{08A65486-8622-B44B-B775-403F4DD0AF29}"/>
               </a:ext>
             </a:extLst>
           </p:cNvPr>
-          <p:cNvSpPr>
-            <a:spLocks noGrp="1"/>
-          </p:cNvSpPr>
-          <p:nvPr>
-            <p:ph idx="1"/>
-          </p:nvPr>
-        </p:nvSpPr>
-        <p:spPr/>
-        <p:txBody>
-          <a:bodyPr/>
-          <a:lstStyle/>
-          <a:p>
-            <a:endParaRPr lang="en-US"/>
-          </a:p>
-        </p:txBody>
-      </p:sp>
+          <p:cNvPicPr>
+            <a:picLocks noChangeAspect="1"/>
+          </p:cNvPicPr>
+          <p:nvPr/>
+        </p:nvPicPr>
+        <p:blipFill>
+          <a:blip r:embed="rId2"/>
+          <a:stretch>
+            <a:fillRect/>
+          </a:stretch>
+        </p:blipFill>
+        <p:spPr>
+          <a:xfrm>
+            <a:off x="1099931" y="1690688"/>
+            <a:ext cx="5484624" cy="3199364"/>
+          </a:xfrm>
+          <a:prstGeom prst="rect">
+            <a:avLst/>
+          </a:prstGeom>
+        </p:spPr>
+      </p:pic>
+      <p:pic>
+        <p:nvPicPr>
+          <p:cNvPr id="6" name="Picture 5">
+            <a:extLst>
+              <a:ext uri="{FF2B5EF4-FFF2-40B4-BE49-F238E27FC236}">
+                <a16:creationId xmlns:a16="http://schemas.microsoft.com/office/drawing/2014/main" id="{1BFC377A-95C1-8147-B244-66156E47F82C}"/>
+              </a:ext>
+            </a:extLst>
+          </p:cNvPr>
+          <p:cNvPicPr>
+            <a:picLocks noChangeAspect="1"/>
+          </p:cNvPicPr>
+          <p:nvPr/>
+        </p:nvPicPr>
+        <p:blipFill>
+          <a:blip r:embed="rId3"/>
+          <a:stretch>
+            <a:fillRect/>
+          </a:stretch>
+        </p:blipFill>
+        <p:spPr>
+          <a:xfrm>
+            <a:off x="5445278" y="1789595"/>
+            <a:ext cx="5908522" cy="4426020"/>
+          </a:xfrm>
+          <a:prstGeom prst="rect">
+            <a:avLst/>
+          </a:prstGeom>
+        </p:spPr>
+      </p:pic>
+      <p:pic>
+        <p:nvPicPr>
+          <p:cNvPr id="7" name="Picture 6">
+            <a:extLst>
+              <a:ext uri="{FF2B5EF4-FFF2-40B4-BE49-F238E27FC236}">
+                <a16:creationId xmlns:a16="http://schemas.microsoft.com/office/drawing/2014/main" id="{EC0A8ACC-7301-3645-8766-E3A528F793DE}"/>
+              </a:ext>
+            </a:extLst>
+          </p:cNvPr>
+          <p:cNvPicPr>
+            <a:picLocks noChangeAspect="1"/>
+          </p:cNvPicPr>
+          <p:nvPr/>
+        </p:nvPicPr>
+        <p:blipFill>
+          <a:blip r:embed="rId4"/>
+          <a:stretch>
+            <a:fillRect/>
+          </a:stretch>
+        </p:blipFill>
+        <p:spPr>
+          <a:xfrm>
+            <a:off x="2938058" y="1382910"/>
+            <a:ext cx="6031120" cy="5239390"/>
+          </a:xfrm>
+          <a:prstGeom prst="rect">
+            <a:avLst/>
+          </a:prstGeom>
+        </p:spPr>
+      </p:pic>
     </p:spTree>
     <p:extLst>
       <p:ext uri="{BB962C8B-B14F-4D97-AF65-F5344CB8AC3E}">
@@ -5303,6 +5368,265 @@
   <p:clrMapOvr>
     <a:masterClrMapping/>
   </p:clrMapOvr>
+  <p:timing>
+    <p:tnLst>
+      <p:par>
+        <p:cTn id="1" dur="indefinite" restart="never" nodeType="tmRoot">
+          <p:childTnLst>
+            <p:seq concurrent="1" nextAc="seek">
+              <p:cTn id="2" dur="indefinite" nodeType="mainSeq">
+                <p:childTnLst>
+                  <p:par>
+                    <p:cTn id="3" fill="hold">
+                      <p:stCondLst>
+                        <p:cond delay="indefinite"/>
+                      </p:stCondLst>
+                      <p:childTnLst>
+                        <p:par>
+                          <p:cTn id="4" fill="hold">
+                            <p:stCondLst>
+                              <p:cond delay="0"/>
+                            </p:stCondLst>
+                            <p:childTnLst>
+                              <p:par>
+                                <p:cTn id="5" presetID="10" presetClass="entr" presetSubtype="0" fill="hold" nodeType="clickEffect">
+                                  <p:stCondLst>
+                                    <p:cond delay="0"/>
+                                  </p:stCondLst>
+                                  <p:childTnLst>
+                                    <p:set>
+                                      <p:cBhvr>
+                                        <p:cTn id="6" dur="1" fill="hold">
+                                          <p:stCondLst>
+                                            <p:cond delay="0"/>
+                                          </p:stCondLst>
+                                        </p:cTn>
+                                        <p:tgtEl>
+                                          <p:spTgt spid="4"/>
+                                        </p:tgtEl>
+                                        <p:attrNameLst>
+                                          <p:attrName>style.visibility</p:attrName>
+                                        </p:attrNameLst>
+                                      </p:cBhvr>
+                                      <p:to>
+                                        <p:strVal val="visible"/>
+                                      </p:to>
+                                    </p:set>
+                                    <p:animEffect transition="in" filter="fade">
+                                      <p:cBhvr>
+                                        <p:cTn id="7" dur="500"/>
+                                        <p:tgtEl>
+                                          <p:spTgt spid="4"/>
+                                        </p:tgtEl>
+                                      </p:cBhvr>
+                                    </p:animEffect>
+                                  </p:childTnLst>
+                                </p:cTn>
+                              </p:par>
+                            </p:childTnLst>
+                          </p:cTn>
+                        </p:par>
+                      </p:childTnLst>
+                    </p:cTn>
+                  </p:par>
+                  <p:par>
+                    <p:cTn id="8" fill="hold">
+                      <p:stCondLst>
+                        <p:cond delay="indefinite"/>
+                      </p:stCondLst>
+                      <p:childTnLst>
+                        <p:par>
+                          <p:cTn id="9" fill="hold">
+                            <p:stCondLst>
+                              <p:cond delay="0"/>
+                            </p:stCondLst>
+                            <p:childTnLst>
+                              <p:par>
+                                <p:cTn id="10" presetID="10" presetClass="entr" presetSubtype="0" fill="hold" nodeType="clickEffect">
+                                  <p:stCondLst>
+                                    <p:cond delay="0"/>
+                                  </p:stCondLst>
+                                  <p:childTnLst>
+                                    <p:set>
+                                      <p:cBhvr>
+                                        <p:cTn id="11" dur="1" fill="hold">
+                                          <p:stCondLst>
+                                            <p:cond delay="0"/>
+                                          </p:stCondLst>
+                                        </p:cTn>
+                                        <p:tgtEl>
+                                          <p:spTgt spid="6"/>
+                                        </p:tgtEl>
+                                        <p:attrNameLst>
+                                          <p:attrName>style.visibility</p:attrName>
+                                        </p:attrNameLst>
+                                      </p:cBhvr>
+                                      <p:to>
+                                        <p:strVal val="visible"/>
+                                      </p:to>
+                                    </p:set>
+                                    <p:animEffect transition="in" filter="fade">
+                                      <p:cBhvr>
+                                        <p:cTn id="12" dur="500"/>
+                                        <p:tgtEl>
+                                          <p:spTgt spid="6"/>
+                                        </p:tgtEl>
+                                      </p:cBhvr>
+                                    </p:animEffect>
+                                  </p:childTnLst>
+                                </p:cTn>
+                              </p:par>
+                              <p:par>
+                                <p:cTn id="13" presetID="10" presetClass="exit" presetSubtype="0" fill="hold" nodeType="withEffect">
+                                  <p:stCondLst>
+                                    <p:cond delay="0"/>
+                                  </p:stCondLst>
+                                  <p:childTnLst>
+                                    <p:animEffect transition="out" filter="fade">
+                                      <p:cBhvr>
+                                        <p:cTn id="14" dur="500"/>
+                                        <p:tgtEl>
+                                          <p:spTgt spid="4"/>
+                                        </p:tgtEl>
+                                      </p:cBhvr>
+                                    </p:animEffect>
+                                    <p:set>
+                                      <p:cBhvr>
+                                        <p:cTn id="15" dur="1" fill="hold">
+                                          <p:stCondLst>
+                                            <p:cond delay="499"/>
+                                          </p:stCondLst>
+                                        </p:cTn>
+                                        <p:tgtEl>
+                                          <p:spTgt spid="4"/>
+                                        </p:tgtEl>
+                                        <p:attrNameLst>
+                                          <p:attrName>style.visibility</p:attrName>
+                                        </p:attrNameLst>
+                                      </p:cBhvr>
+                                      <p:to>
+                                        <p:strVal val="hidden"/>
+                                      </p:to>
+                                    </p:set>
+                                  </p:childTnLst>
+                                </p:cTn>
+                              </p:par>
+                            </p:childTnLst>
+                          </p:cTn>
+                        </p:par>
+                      </p:childTnLst>
+                    </p:cTn>
+                  </p:par>
+                  <p:par>
+                    <p:cTn id="16" fill="hold">
+                      <p:stCondLst>
+                        <p:cond delay="indefinite"/>
+                      </p:stCondLst>
+                      <p:childTnLst>
+                        <p:par>
+                          <p:cTn id="17" fill="hold">
+                            <p:stCondLst>
+                              <p:cond delay="0"/>
+                            </p:stCondLst>
+                            <p:childTnLst>
+                              <p:par>
+                                <p:cTn id="18" presetID="10" presetClass="entr" presetSubtype="0" fill="hold" nodeType="clickEffect">
+                                  <p:stCondLst>
+                                    <p:cond delay="0"/>
+                                  </p:stCondLst>
+                                  <p:childTnLst>
+                                    <p:set>
+                                      <p:cBhvr>
+                                        <p:cTn id="19" dur="1" fill="hold">
+                                          <p:stCondLst>
+                                            <p:cond delay="0"/>
+                                          </p:stCondLst>
+                                        </p:cTn>
+                                        <p:tgtEl>
+                                          <p:spTgt spid="7"/>
+                                        </p:tgtEl>
+                                        <p:attrNameLst>
+                                          <p:attrName>style.visibility</p:attrName>
+                                        </p:attrNameLst>
+                                      </p:cBhvr>
+                                      <p:to>
+                                        <p:strVal val="visible"/>
+                                      </p:to>
+                                    </p:set>
+                                    <p:animEffect transition="in" filter="fade">
+                                      <p:cBhvr>
+                                        <p:cTn id="20" dur="500"/>
+                                        <p:tgtEl>
+                                          <p:spTgt spid="7"/>
+                                        </p:tgtEl>
+                                      </p:cBhvr>
+                                    </p:animEffect>
+                                  </p:childTnLst>
+                                </p:cTn>
+                              </p:par>
+                              <p:par>
+                                <p:cTn id="21" presetID="10" presetClass="exit" presetSubtype="0" fill="hold" nodeType="withEffect">
+                                  <p:stCondLst>
+                                    <p:cond delay="0"/>
+                                  </p:stCondLst>
+                                  <p:childTnLst>
+                                    <p:animEffect transition="out" filter="fade">
+                                      <p:cBhvr>
+                                        <p:cTn id="22" dur="500"/>
+                                        <p:tgtEl>
+                                          <p:spTgt spid="6"/>
+                                        </p:tgtEl>
+                                      </p:cBhvr>
+                                    </p:animEffect>
+                                    <p:set>
+                                      <p:cBhvr>
+                                        <p:cTn id="23" dur="1" fill="hold">
+                                          <p:stCondLst>
+                                            <p:cond delay="499"/>
+                                          </p:stCondLst>
+                                        </p:cTn>
+                                        <p:tgtEl>
+                                          <p:spTgt spid="6"/>
+                                        </p:tgtEl>
+                                        <p:attrNameLst>
+                                          <p:attrName>style.visibility</p:attrName>
+                                        </p:attrNameLst>
+                                      </p:cBhvr>
+                                      <p:to>
+                                        <p:strVal val="hidden"/>
+                                      </p:to>
+                                    </p:set>
+                                  </p:childTnLst>
+                                </p:cTn>
+                              </p:par>
+                            </p:childTnLst>
+                          </p:cTn>
+                        </p:par>
+                      </p:childTnLst>
+                    </p:cTn>
+                  </p:par>
+                </p:childTnLst>
+              </p:cTn>
+              <p:prevCondLst>
+                <p:cond evt="onPrev" delay="0">
+                  <p:tgtEl>
+                    <p:sldTgt/>
+                  </p:tgtEl>
+                </p:cond>
+              </p:prevCondLst>
+              <p:nextCondLst>
+                <p:cond evt="onNext" delay="0">
+                  <p:tgtEl>
+                    <p:sldTgt/>
+                  </p:tgtEl>
+                </p:cond>
+              </p:nextCondLst>
+            </p:seq>
+          </p:childTnLst>
+        </p:cTn>
+      </p:par>
+    </p:tnLst>
+  </p:timing>
 </p:sld>
 </file>
 
@@ -5379,7 +5703,7 @@
             </a:pPr>
             <a:r>
               <a:rPr lang="en-US" dirty="0"/>
-              <a:t>How many donuts are we rolling out? Hourly? Per minute?</a:t>
+              <a:t>How many donuts are we rolling out, over time?</a:t>
             </a:r>
           </a:p>
           <a:p>
@@ -5409,7 +5733,7 @@
             </a:pPr>
             <a:r>
               <a:rPr lang="en-US" dirty="0"/>
-              <a:t>Is a machine having trouble, with too many messed up donuts?</a:t>
+              <a:t>Is a store having trouble, with too many messed-up donuts?</a:t>
             </a:r>
           </a:p>
           <a:p>
@@ -5424,7 +5748,7 @@
             </a:pPr>
             <a:r>
               <a:rPr lang="en-US" dirty="0"/>
-              <a:t>How's the conveyor belt doing? Any speed anomalies?</a:t>
+              <a:t>How can we deal with out-of-order events?</a:t>
             </a:r>
           </a:p>
           <a:p>
@@ -5461,7 +5785,7 @@
 </file>
 
 <file path=ppt/slides/slide17.xml><?xml version="1.0" encoding="utf-8"?>
-<p:sld xmlns:a="http://schemas.openxmlformats.org/drawingml/2006/main" xmlns:r="http://schemas.openxmlformats.org/officeDocument/2006/relationships" xmlns:p="http://schemas.openxmlformats.org/presentationml/2006/main">
+<p:sld xmlns:a="http://schemas.openxmlformats.org/drawingml/2006/main" xmlns:r="http://schemas.openxmlformats.org/officeDocument/2006/relationships" xmlns:p="http://schemas.openxmlformats.org/presentationml/2006/main" show="0">
   <p:cSld>
     <p:spTree>
       <p:nvGrpSpPr>
@@ -5548,7 +5872,7 @@
             </a:pPr>
             <a:r>
               <a:rPr lang="en-US" dirty="0"/>
-              <a:t>Donuts (or workers???) that never make it to the end?</a:t>
+              <a:t>Donuts that never make it to the end?</a:t>
             </a:r>
           </a:p>
           <a:p>
@@ -5790,7 +6114,17 @@
             </a:pPr>
             <a:r>
               <a:rPr lang="en-US" dirty="0"/>
-              <a:t>Intro to Stream Analytics:</a:t>
+              <a:t>Intro to Stream Analytics (</a:t>
+            </a:r>
+            <a:r>
+              <a:rPr lang="en-US" dirty="0">
+                <a:hlinkClick r:id="rId2"/>
+              </a:rPr>
+              <a:t>link</a:t>
+            </a:r>
+            <a:r>
+              <a:rPr lang="en-US" dirty="0"/>
+              <a:t>)</a:t>
             </a:r>
           </a:p>
           <a:p>
@@ -5805,7 +6139,17 @@
             </a:pPr>
             <a:r>
               <a:rPr lang="en-US" dirty="0"/>
-              <a:t>Intro to Spark:</a:t>
+              <a:t>Intro to Spark (</a:t>
+            </a:r>
+            <a:r>
+              <a:rPr lang="en-US" dirty="0">
+                <a:hlinkClick r:id="rId3"/>
+              </a:rPr>
+              <a:t>link</a:t>
+            </a:r>
+            <a:r>
+              <a:rPr lang="en-US" dirty="0"/>
+              <a:t>)</a:t>
             </a:r>
           </a:p>
         </p:txBody>

</xml_diff>

<commit_message>
demo tweaks; fixed several queries
</commit_message>
<xml_diff>
--- a/stream-processing-galaxy.pptx
+++ b/stream-processing-galaxy.pptx
@@ -215,7 +215,7 @@
           <a:p>
             <a:fld id="{D3E57187-9A38-7B49-9A89-339F6723DB01}" type="datetimeFigureOut">
               <a:rPr lang="en-US" smtClean="0"/>
-              <a:t>6/7/19</a:t>
+              <a:t>7/2/19</a:t>
             </a:fld>
             <a:endParaRPr lang="en-US"/>
           </a:p>
@@ -629,7 +629,7 @@
           <a:p>
             <a:fld id="{E54C60CF-FB58-1E4B-A6D0-C94527E30409}" type="datetimeFigureOut">
               <a:rPr lang="en-US" smtClean="0"/>
-              <a:t>6/7/19</a:t>
+              <a:t>7/2/19</a:t>
             </a:fld>
             <a:endParaRPr lang="en-US"/>
           </a:p>
@@ -827,7 +827,7 @@
           <a:p>
             <a:fld id="{E54C60CF-FB58-1E4B-A6D0-C94527E30409}" type="datetimeFigureOut">
               <a:rPr lang="en-US" smtClean="0"/>
-              <a:t>6/7/19</a:t>
+              <a:t>7/2/19</a:t>
             </a:fld>
             <a:endParaRPr lang="en-US"/>
           </a:p>
@@ -1035,7 +1035,7 @@
           <a:p>
             <a:fld id="{E54C60CF-FB58-1E4B-A6D0-C94527E30409}" type="datetimeFigureOut">
               <a:rPr lang="en-US" smtClean="0"/>
-              <a:t>6/7/19</a:t>
+              <a:t>7/2/19</a:t>
             </a:fld>
             <a:endParaRPr lang="en-US"/>
           </a:p>
@@ -1811,7 +1811,7 @@
           <a:p>
             <a:fld id="{E54C60CF-FB58-1E4B-A6D0-C94527E30409}" type="datetimeFigureOut">
               <a:rPr lang="en-US" smtClean="0"/>
-              <a:t>6/7/19</a:t>
+              <a:t>7/2/19</a:t>
             </a:fld>
             <a:endParaRPr lang="en-US"/>
           </a:p>
@@ -2223,7 +2223,7 @@
           <a:p>
             <a:fld id="{E54C60CF-FB58-1E4B-A6D0-C94527E30409}" type="datetimeFigureOut">
               <a:rPr lang="en-US" smtClean="0"/>
-              <a:t>6/7/19</a:t>
+              <a:t>7/2/19</a:t>
             </a:fld>
             <a:endParaRPr lang="en-US"/>
           </a:p>
@@ -2364,7 +2364,7 @@
           <a:p>
             <a:fld id="{E54C60CF-FB58-1E4B-A6D0-C94527E30409}" type="datetimeFigureOut">
               <a:rPr lang="en-US" smtClean="0"/>
-              <a:t>6/7/19</a:t>
+              <a:t>7/2/19</a:t>
             </a:fld>
             <a:endParaRPr lang="en-US"/>
           </a:p>
@@ -2477,7 +2477,7 @@
           <a:p>
             <a:fld id="{E54C60CF-FB58-1E4B-A6D0-C94527E30409}" type="datetimeFigureOut">
               <a:rPr lang="en-US" smtClean="0"/>
-              <a:t>6/7/19</a:t>
+              <a:t>7/2/19</a:t>
             </a:fld>
             <a:endParaRPr lang="en-US"/>
           </a:p>
@@ -2788,7 +2788,7 @@
           <a:p>
             <a:fld id="{E54C60CF-FB58-1E4B-A6D0-C94527E30409}" type="datetimeFigureOut">
               <a:rPr lang="en-US" smtClean="0"/>
-              <a:t>6/7/19</a:t>
+              <a:t>7/2/19</a:t>
             </a:fld>
             <a:endParaRPr lang="en-US"/>
           </a:p>
@@ -3076,7 +3076,7 @@
           <a:p>
             <a:fld id="{E54C60CF-FB58-1E4B-A6D0-C94527E30409}" type="datetimeFigureOut">
               <a:rPr lang="en-US" smtClean="0"/>
-              <a:t>6/7/19</a:t>
+              <a:t>7/2/19</a:t>
             </a:fld>
             <a:endParaRPr lang="en-US"/>
           </a:p>
@@ -3322,7 +3322,7 @@
           <a:p>
             <a:fld id="{E54C60CF-FB58-1E4B-A6D0-C94527E30409}" type="datetimeFigureOut">
               <a:rPr lang="en-US" smtClean="0"/>
-              <a:t>6/7/19</a:t>
+              <a:t>7/2/19</a:t>
             </a:fld>
             <a:endParaRPr lang="en-US"/>
           </a:p>
@@ -6099,7 +6099,7 @@
             </a:r>
             <a:r>
               <a:rPr lang="en-US" dirty="0"/>
-              <a:t>/revconf2019-intro-to-streaming</a:t>
+              <a:t>/intro-to-streaming</a:t>
             </a:r>
           </a:p>
           <a:p>

</xml_diff>